<commit_message>
update slides on 5
</commit_message>
<xml_diff>
--- a/episodes/05_histograms/histograms.pptx
+++ b/episodes/05_histograms/histograms.pptx
@@ -7,13 +7,14 @@
     <p:sldMasterId id="2147483752" r:id="rId3"/>
   </p:sldMasterIdLst>
   <p:notesMasterIdLst>
-    <p:notesMasterId r:id="rId8"/>
+    <p:notesMasterId r:id="rId9"/>
   </p:notesMasterIdLst>
   <p:sldIdLst>
     <p:sldId id="260" r:id="rId4"/>
     <p:sldId id="265" r:id="rId5"/>
     <p:sldId id="261" r:id="rId6"/>
     <p:sldId id="264" r:id="rId7"/>
+    <p:sldId id="266" r:id="rId8"/>
   </p:sldIdLst>
   <p:sldSz cx="12192000" cy="6858000"/>
   <p:notesSz cx="6858000" cy="9144000"/>
@@ -201,7 +202,7 @@
           </a:lstStyle>
           <a:p>
             <a:fld id="{8E519FCE-A50F-4DED-9A71-13FE2E53726C}" type="datetimeFigureOut">
-              <a:t>05/03/2024</a:t>
+              <a:t>10/03/2024</a:t>
             </a:fld>
             <a:endParaRPr lang="en-US"/>
           </a:p>
@@ -714,7 +715,7 @@
           <a:p>
             <a:fld id="{846CE7D5-CF57-46EF-B807-FDD0502418D4}" type="datetimeFigureOut">
               <a:rPr lang="en-US" smtClean="0"/>
-              <a:t>3/5/2024</a:t>
+              <a:t>3/10/2024</a:t>
             </a:fld>
             <a:endParaRPr lang="en-US"/>
           </a:p>
@@ -884,7 +885,7 @@
           <a:p>
             <a:fld id="{846CE7D5-CF57-46EF-B807-FDD0502418D4}" type="datetimeFigureOut">
               <a:rPr lang="en-US" smtClean="0"/>
-              <a:t>3/5/2024</a:t>
+              <a:t>3/10/2024</a:t>
             </a:fld>
             <a:endParaRPr lang="en-US"/>
           </a:p>
@@ -1064,7 +1065,7 @@
           <a:p>
             <a:fld id="{846CE7D5-CF57-46EF-B807-FDD0502418D4}" type="datetimeFigureOut">
               <a:rPr lang="en-US" smtClean="0"/>
-              <a:t>3/5/2024</a:t>
+              <a:t>3/10/2024</a:t>
             </a:fld>
             <a:endParaRPr lang="en-US"/>
           </a:p>
@@ -2549,7 +2550,7 @@
           <a:p>
             <a:fld id="{846CE7D5-CF57-46EF-B807-FDD0502418D4}" type="datetimeFigureOut">
               <a:rPr lang="en-US" smtClean="0"/>
-              <a:t>3/5/2024</a:t>
+              <a:t>3/10/2024</a:t>
             </a:fld>
             <a:endParaRPr lang="en-US"/>
           </a:p>
@@ -3800,7 +3801,7 @@
           <a:p>
             <a:fld id="{EA730EFB-AB28-4A68-9CF2-24FEA7CF3D98}" type="datetimeFigureOut">
               <a:rPr lang="en-US" smtClean="0"/>
-              <a:t>3/5/2024</a:t>
+              <a:t>3/10/2024</a:t>
             </a:fld>
             <a:endParaRPr lang="en-US"/>
           </a:p>
@@ -4788,7 +4789,7 @@
           <a:p>
             <a:fld id="{846CE7D5-CF57-46EF-B807-FDD0502418D4}" type="datetimeFigureOut">
               <a:rPr lang="en-US" smtClean="0"/>
-              <a:t>3/5/2024</a:t>
+              <a:t>3/10/2024</a:t>
             </a:fld>
             <a:endParaRPr lang="en-US"/>
           </a:p>
@@ -6630,7 +6631,7 @@
           <a:p>
             <a:fld id="{846CE7D5-CF57-46EF-B807-FDD0502418D4}" type="datetimeFigureOut">
               <a:rPr lang="en-US" smtClean="0"/>
-              <a:t>3/5/2024</a:t>
+              <a:t>3/10/2024</a:t>
             </a:fld>
             <a:endParaRPr lang="en-US"/>
           </a:p>
@@ -6997,7 +6998,7 @@
           <a:p>
             <a:fld id="{846CE7D5-CF57-46EF-B807-FDD0502418D4}" type="datetimeFigureOut">
               <a:rPr lang="en-US" smtClean="0"/>
-              <a:t>3/5/2024</a:t>
+              <a:t>3/10/2024</a:t>
             </a:fld>
             <a:endParaRPr lang="en-US"/>
           </a:p>
@@ -7115,7 +7116,7 @@
           <a:p>
             <a:fld id="{846CE7D5-CF57-46EF-B807-FDD0502418D4}" type="datetimeFigureOut">
               <a:rPr lang="en-US" smtClean="0"/>
-              <a:t>3/5/2024</a:t>
+              <a:t>3/10/2024</a:t>
             </a:fld>
             <a:endParaRPr lang="en-US"/>
           </a:p>
@@ -7210,7 +7211,7 @@
           <a:p>
             <a:fld id="{846CE7D5-CF57-46EF-B807-FDD0502418D4}" type="datetimeFigureOut">
               <a:rPr lang="en-US" smtClean="0"/>
-              <a:t>3/5/2024</a:t>
+              <a:t>3/10/2024</a:t>
             </a:fld>
             <a:endParaRPr lang="en-US"/>
           </a:p>
@@ -7487,7 +7488,7 @@
           <a:p>
             <a:fld id="{846CE7D5-CF57-46EF-B807-FDD0502418D4}" type="datetimeFigureOut">
               <a:rPr lang="en-US" smtClean="0"/>
-              <a:t>3/5/2024</a:t>
+              <a:t>3/10/2024</a:t>
             </a:fld>
             <a:endParaRPr lang="en-US"/>
           </a:p>
@@ -7744,7 +7745,7 @@
           <a:p>
             <a:fld id="{846CE7D5-CF57-46EF-B807-FDD0502418D4}" type="datetimeFigureOut">
               <a:rPr lang="en-US" smtClean="0"/>
-              <a:t>3/5/2024</a:t>
+              <a:t>3/10/2024</a:t>
             </a:fld>
             <a:endParaRPr lang="en-US"/>
           </a:p>
@@ -7957,7 +7958,7 @@
           <a:p>
             <a:fld id="{846CE7D5-CF57-46EF-B807-FDD0502418D4}" type="datetimeFigureOut">
               <a:rPr lang="en-US" smtClean="0"/>
-              <a:t>3/5/2024</a:t>
+              <a:t>3/10/2024</a:t>
             </a:fld>
             <a:endParaRPr lang="en-US"/>
           </a:p>
@@ -11042,6 +11043,670 @@
     <p:extLst>
       <p:ext uri="{BB962C8B-B14F-4D97-AF65-F5344CB8AC3E}">
         <p14:creationId xmlns:p14="http://schemas.microsoft.com/office/powerpoint/2010/main" val="2464153552"/>
+      </p:ext>
+    </p:extLst>
+  </p:cSld>
+  <p:clrMapOvr>
+    <a:masterClrMapping/>
+  </p:clrMapOvr>
+</p:sld>
+</file>
+
+<file path=ppt/slides/slide5.xml><?xml version="1.0" encoding="utf-8"?>
+<p:sld xmlns:a="http://schemas.openxmlformats.org/drawingml/2006/main" xmlns:r="http://schemas.openxmlformats.org/officeDocument/2006/relationships" xmlns:p="http://schemas.openxmlformats.org/presentationml/2006/main">
+  <p:cSld>
+    <p:spTree>
+      <p:nvGrpSpPr>
+        <p:cNvPr id="1" name="">
+          <a:extLst>
+            <a:ext uri="{FF2B5EF4-FFF2-40B4-BE49-F238E27FC236}">
+              <a16:creationId xmlns:a16="http://schemas.microsoft.com/office/drawing/2014/main" id="{7B03E6A8-361A-682E-A6BA-884963EC38D9}"/>
+            </a:ext>
+          </a:extLst>
+        </p:cNvPr>
+        <p:cNvGrpSpPr/>
+        <p:nvPr/>
+      </p:nvGrpSpPr>
+      <p:grpSpPr>
+        <a:xfrm>
+          <a:off x="0" y="0"/>
+          <a:ext cx="0" cy="0"/>
+          <a:chOff x="0" y="0"/>
+          <a:chExt cx="0" cy="0"/>
+        </a:xfrm>
+      </p:grpSpPr>
+      <p:sp>
+        <p:nvSpPr>
+          <p:cNvPr id="3" name="TextBox 1">
+            <a:extLst>
+              <a:ext uri="{FF2B5EF4-FFF2-40B4-BE49-F238E27FC236}">
+                <a16:creationId xmlns:a16="http://schemas.microsoft.com/office/drawing/2014/main" id="{6C9877C3-9F75-82D0-A677-2AB73AB83C44}"/>
+              </a:ext>
+            </a:extLst>
+          </p:cNvPr>
+          <p:cNvSpPr txBox="1"/>
+          <p:nvPr/>
+        </p:nvSpPr>
+        <p:spPr>
+          <a:xfrm>
+            <a:off x="1153417" y="374369"/>
+            <a:ext cx="10000352" cy="584775"/>
+          </a:xfrm>
+          <a:prstGeom prst="rect">
+            <a:avLst/>
+          </a:prstGeom>
+          <a:noFill/>
+        </p:spPr>
+        <p:txBody>
+          <a:bodyPr wrap="square" lIns="91440" tIns="45720" rIns="91440" bIns="45720" rtlCol="0" anchor="t">
+            <a:spAutoFit/>
+          </a:bodyPr>
+          <a:lstStyle>
+            <a:defPPr>
+              <a:defRPr lang="en-US"/>
+            </a:defPPr>
+            <a:lvl1pPr marL="0" algn="l" defTabSz="914400" rtl="0" eaLnBrk="1" latinLnBrk="0" hangingPunct="1">
+              <a:defRPr sz="1800" kern="1200">
+                <a:solidFill>
+                  <a:schemeClr val="tx1"/>
+                </a:solidFill>
+                <a:latin typeface="+mn-lt"/>
+                <a:ea typeface="+mn-ea"/>
+                <a:cs typeface="+mn-cs"/>
+              </a:defRPr>
+            </a:lvl1pPr>
+            <a:lvl2pPr marL="457200" algn="l" defTabSz="914400" rtl="0" eaLnBrk="1" latinLnBrk="0" hangingPunct="1">
+              <a:defRPr sz="1800" kern="1200">
+                <a:solidFill>
+                  <a:schemeClr val="tx1"/>
+                </a:solidFill>
+                <a:latin typeface="+mn-lt"/>
+                <a:ea typeface="+mn-ea"/>
+                <a:cs typeface="+mn-cs"/>
+              </a:defRPr>
+            </a:lvl2pPr>
+            <a:lvl3pPr marL="914400" algn="l" defTabSz="914400" rtl="0" eaLnBrk="1" latinLnBrk="0" hangingPunct="1">
+              <a:defRPr sz="1800" kern="1200">
+                <a:solidFill>
+                  <a:schemeClr val="tx1"/>
+                </a:solidFill>
+                <a:latin typeface="+mn-lt"/>
+                <a:ea typeface="+mn-ea"/>
+                <a:cs typeface="+mn-cs"/>
+              </a:defRPr>
+            </a:lvl3pPr>
+            <a:lvl4pPr marL="1371600" algn="l" defTabSz="914400" rtl="0" eaLnBrk="1" latinLnBrk="0" hangingPunct="1">
+              <a:defRPr sz="1800" kern="1200">
+                <a:solidFill>
+                  <a:schemeClr val="tx1"/>
+                </a:solidFill>
+                <a:latin typeface="+mn-lt"/>
+                <a:ea typeface="+mn-ea"/>
+                <a:cs typeface="+mn-cs"/>
+              </a:defRPr>
+            </a:lvl4pPr>
+            <a:lvl5pPr marL="1828800" algn="l" defTabSz="914400" rtl="0" eaLnBrk="1" latinLnBrk="0" hangingPunct="1">
+              <a:defRPr sz="1800" kern="1200">
+                <a:solidFill>
+                  <a:schemeClr val="tx1"/>
+                </a:solidFill>
+                <a:latin typeface="+mn-lt"/>
+                <a:ea typeface="+mn-ea"/>
+                <a:cs typeface="+mn-cs"/>
+              </a:defRPr>
+            </a:lvl5pPr>
+            <a:lvl6pPr marL="2286000" algn="l" defTabSz="914400" rtl="0" eaLnBrk="1" latinLnBrk="0" hangingPunct="1">
+              <a:defRPr sz="1800" kern="1200">
+                <a:solidFill>
+                  <a:schemeClr val="tx1"/>
+                </a:solidFill>
+                <a:latin typeface="+mn-lt"/>
+                <a:ea typeface="+mn-ea"/>
+                <a:cs typeface="+mn-cs"/>
+              </a:defRPr>
+            </a:lvl6pPr>
+            <a:lvl7pPr marL="2743200" algn="l" defTabSz="914400" rtl="0" eaLnBrk="1" latinLnBrk="0" hangingPunct="1">
+              <a:defRPr sz="1800" kern="1200">
+                <a:solidFill>
+                  <a:schemeClr val="tx1"/>
+                </a:solidFill>
+                <a:latin typeface="+mn-lt"/>
+                <a:ea typeface="+mn-ea"/>
+                <a:cs typeface="+mn-cs"/>
+              </a:defRPr>
+            </a:lvl7pPr>
+            <a:lvl8pPr marL="3200400" algn="l" defTabSz="914400" rtl="0" eaLnBrk="1" latinLnBrk="0" hangingPunct="1">
+              <a:defRPr sz="1800" kern="1200">
+                <a:solidFill>
+                  <a:schemeClr val="tx1"/>
+                </a:solidFill>
+                <a:latin typeface="+mn-lt"/>
+                <a:ea typeface="+mn-ea"/>
+                <a:cs typeface="+mn-cs"/>
+              </a:defRPr>
+            </a:lvl8pPr>
+            <a:lvl9pPr marL="3657600" algn="l" defTabSz="914400" rtl="0" eaLnBrk="1" latinLnBrk="0" hangingPunct="1">
+              <a:defRPr sz="1800" kern="1200">
+                <a:solidFill>
+                  <a:schemeClr val="tx1"/>
+                </a:solidFill>
+                <a:latin typeface="+mn-lt"/>
+                <a:ea typeface="+mn-ea"/>
+                <a:cs typeface="+mn-cs"/>
+              </a:defRPr>
+            </a:lvl9pPr>
+          </a:lstStyle>
+          <a:p>
+            <a:pPr algn="ctr"/>
+            <a:r>
+              <a:rPr lang="en-US" sz="3200" b="1" spc="-1" dirty="0">
+                <a:solidFill>
+                  <a:schemeClr val="accent2">
+                    <a:lumMod val="75000"/>
+                    <a:lumOff val="25000"/>
+                  </a:schemeClr>
+                </a:solidFill>
+                <a:latin typeface="Assistant" pitchFamily="2" charset="-79"/>
+                <a:cs typeface="Assistant" pitchFamily="2" charset="-79"/>
+              </a:rPr>
+              <a:t>Histograms </a:t>
+            </a:r>
+            <a:r>
+              <a:rPr lang="en-US" sz="2800" b="1" dirty="0">
+                <a:solidFill>
+                  <a:schemeClr val="accent2">
+                    <a:lumMod val="75000"/>
+                    <a:lumOff val="25000"/>
+                  </a:schemeClr>
+                </a:solidFill>
+                <a:latin typeface="Assistant" pitchFamily="2" charset="-79"/>
+                <a:cs typeface="Assistant" pitchFamily="2" charset="-79"/>
+              </a:rPr>
+              <a:t>   </a:t>
+            </a:r>
+          </a:p>
+        </p:txBody>
+      </p:sp>
+      <p:sp>
+        <p:nvSpPr>
+          <p:cNvPr id="2" name="TextBox 1">
+            <a:extLst>
+              <a:ext uri="{FF2B5EF4-FFF2-40B4-BE49-F238E27FC236}">
+                <a16:creationId xmlns:a16="http://schemas.microsoft.com/office/drawing/2014/main" id="{1E589164-E55B-2C81-1DA9-7C3FEB044760}"/>
+              </a:ext>
+            </a:extLst>
+          </p:cNvPr>
+          <p:cNvSpPr txBox="1"/>
+          <p:nvPr/>
+        </p:nvSpPr>
+        <p:spPr>
+          <a:xfrm>
+            <a:off x="762000" y="1451428"/>
+            <a:ext cx="10127340" cy="4801314"/>
+          </a:xfrm>
+          <a:prstGeom prst="rect">
+            <a:avLst/>
+          </a:prstGeom>
+          <a:noFill/>
+        </p:spPr>
+        <p:txBody>
+          <a:bodyPr rot="0" spcFirstLastPara="0" vertOverflow="overflow" horzOverflow="overflow" vert="horz" wrap="square" lIns="91440" tIns="45720" rIns="91440" bIns="45720" numCol="1" spcCol="0" rtlCol="0" fromWordArt="0" anchor="t" anchorCtr="0" forceAA="0" compatLnSpc="1">
+            <a:prstTxWarp prst="textNoShape">
+              <a:avLst/>
+            </a:prstTxWarp>
+            <a:spAutoFit/>
+          </a:bodyPr>
+          <a:lstStyle/>
+          <a:p>
+            <a:r>
+              <a:rPr lang="en-US" sz="2400" dirty="0">
+                <a:ea typeface="+mn-lt"/>
+                <a:cs typeface="+mn-lt"/>
+              </a:rPr>
+              <a:t>Final thoughts:</a:t>
+            </a:r>
+          </a:p>
+          <a:p>
+            <a:endParaRPr lang="en-US" sz="2400" dirty="0">
+              <a:ea typeface="+mn-lt"/>
+              <a:cs typeface="+mn-lt"/>
+            </a:endParaRPr>
+          </a:p>
+          <a:p>
+            <a:endParaRPr lang="en-US" sz="2400" dirty="0">
+              <a:ea typeface="+mn-lt"/>
+              <a:cs typeface="+mn-lt"/>
+            </a:endParaRPr>
+          </a:p>
+          <a:p>
+            <a:r>
+              <a:rPr lang="en-US" sz="2400" dirty="0">
+                <a:ea typeface="+mn-lt"/>
+                <a:cs typeface="+mn-lt"/>
+              </a:rPr>
+              <a:t>We can display histograms well if we understand matplotlib: </a:t>
+            </a:r>
+            <a:r>
+              <a:rPr kumimoji="0" lang="en-NL" altLang="en-NL" sz="2400" b="0" i="0" u="none" strike="noStrike" cap="none" normalizeH="0" baseline="0" dirty="0">
+                <a:ln>
+                  <a:noFill/>
+                </a:ln>
+                <a:solidFill>
+                  <a:schemeClr val="tx1"/>
+                </a:solidFill>
+                <a:effectLst/>
+                <a:latin typeface="Arial Unicode MS"/>
+              </a:rPr>
+              <a:t>matplotlib </a:t>
+            </a:r>
+            <a:r>
+              <a:rPr kumimoji="0" lang="en-NL" altLang="en-NL" sz="2400" b="0" i="0" u="none" strike="noStrike" cap="none" normalizeH="0" baseline="0" dirty="0" err="1">
+                <a:ln>
+                  <a:noFill/>
+                </a:ln>
+                <a:solidFill>
+                  <a:schemeClr val="tx1"/>
+                </a:solidFill>
+                <a:effectLst/>
+                <a:latin typeface="Arial Unicode MS"/>
+              </a:rPr>
+              <a:t>pyplot</a:t>
+            </a:r>
+            <a:r>
+              <a:rPr kumimoji="0" lang="en-NL" altLang="en-NL" sz="1800" b="0" i="0" u="none" strike="noStrike" cap="none" normalizeH="0" baseline="0" dirty="0">
+                <a:ln>
+                  <a:noFill/>
+                </a:ln>
+                <a:solidFill>
+                  <a:schemeClr val="tx1"/>
+                </a:solidFill>
+                <a:effectLst/>
+              </a:rPr>
+              <a:t> </a:t>
+            </a:r>
+            <a:r>
+              <a:rPr kumimoji="0" lang="en-NL" altLang="en-NL" sz="2400" b="0" i="0" u="none" strike="noStrike" cap="none" normalizeH="0" baseline="0" dirty="0">
+                <a:ln>
+                  <a:noFill/>
+                </a:ln>
+                <a:solidFill>
+                  <a:schemeClr val="tx1"/>
+                </a:solidFill>
+                <a:effectLst/>
+                <a:latin typeface="Arial Unicode MS"/>
+              </a:rPr>
+              <a:t>figure()</a:t>
+            </a:r>
+            <a:r>
+              <a:rPr kumimoji="0" lang="en-NL" altLang="en-NL" sz="1800" b="0" i="0" u="none" strike="noStrike" cap="none" normalizeH="0" baseline="0" dirty="0">
+                <a:ln>
+                  <a:noFill/>
+                </a:ln>
+                <a:solidFill>
+                  <a:schemeClr val="tx1"/>
+                </a:solidFill>
+                <a:effectLst/>
+              </a:rPr>
+              <a:t>, </a:t>
+            </a:r>
+            <a:r>
+              <a:rPr kumimoji="0" lang="en-NL" altLang="en-NL" sz="2400" b="0" i="0" u="none" strike="noStrike" cap="none" normalizeH="0" baseline="0" dirty="0">
+                <a:ln>
+                  <a:noFill/>
+                </a:ln>
+                <a:solidFill>
+                  <a:schemeClr val="tx1"/>
+                </a:solidFill>
+                <a:effectLst/>
+                <a:latin typeface="Arial Unicode MS"/>
+              </a:rPr>
+              <a:t>title()</a:t>
+            </a:r>
+            <a:r>
+              <a:rPr kumimoji="0" lang="en-NL" altLang="en-NL" sz="1800" b="0" i="0" u="none" strike="noStrike" cap="none" normalizeH="0" baseline="0" dirty="0">
+                <a:ln>
+                  <a:noFill/>
+                </a:ln>
+                <a:solidFill>
+                  <a:schemeClr val="tx1"/>
+                </a:solidFill>
+                <a:effectLst/>
+              </a:rPr>
+              <a:t>, </a:t>
+            </a:r>
+            <a:r>
+              <a:rPr kumimoji="0" lang="en-NL" altLang="en-NL" sz="2400" b="0" i="0" u="none" strike="noStrike" cap="none" normalizeH="0" baseline="0" dirty="0" err="1">
+                <a:ln>
+                  <a:noFill/>
+                </a:ln>
+                <a:solidFill>
+                  <a:schemeClr val="tx1"/>
+                </a:solidFill>
+                <a:effectLst/>
+                <a:latin typeface="Arial Unicode MS"/>
+              </a:rPr>
+              <a:t>xlabel</a:t>
+            </a:r>
+            <a:r>
+              <a:rPr kumimoji="0" lang="en-NL" altLang="en-NL" sz="2400" b="0" i="0" u="none" strike="noStrike" cap="none" normalizeH="0" baseline="0" dirty="0">
+                <a:ln>
+                  <a:noFill/>
+                </a:ln>
+                <a:solidFill>
+                  <a:schemeClr val="tx1"/>
+                </a:solidFill>
+                <a:effectLst/>
+                <a:latin typeface="Arial Unicode MS"/>
+              </a:rPr>
+              <a:t>()</a:t>
+            </a:r>
+            <a:r>
+              <a:rPr kumimoji="0" lang="en-NL" altLang="en-NL" sz="1800" b="0" i="0" u="none" strike="noStrike" cap="none" normalizeH="0" baseline="0" dirty="0">
+                <a:ln>
+                  <a:noFill/>
+                </a:ln>
+                <a:solidFill>
+                  <a:schemeClr val="tx1"/>
+                </a:solidFill>
+                <a:effectLst/>
+              </a:rPr>
+              <a:t>, </a:t>
+            </a:r>
+            <a:r>
+              <a:rPr kumimoji="0" lang="en-NL" altLang="en-NL" sz="2400" b="0" i="0" u="none" strike="noStrike" cap="none" normalizeH="0" baseline="0" dirty="0" err="1">
+                <a:ln>
+                  <a:noFill/>
+                </a:ln>
+                <a:solidFill>
+                  <a:schemeClr val="tx1"/>
+                </a:solidFill>
+                <a:effectLst/>
+                <a:latin typeface="Arial Unicode MS"/>
+              </a:rPr>
+              <a:t>ylabel</a:t>
+            </a:r>
+            <a:r>
+              <a:rPr kumimoji="0" lang="en-NL" altLang="en-NL" sz="2400" b="0" i="0" u="none" strike="noStrike" cap="none" normalizeH="0" baseline="0" dirty="0">
+                <a:ln>
+                  <a:noFill/>
+                </a:ln>
+                <a:solidFill>
+                  <a:schemeClr val="tx1"/>
+                </a:solidFill>
+                <a:effectLst/>
+                <a:latin typeface="Arial Unicode MS"/>
+              </a:rPr>
+              <a:t>()</a:t>
+            </a:r>
+            <a:r>
+              <a:rPr kumimoji="0" lang="en-NL" altLang="en-NL" sz="1800" b="0" i="0" u="none" strike="noStrike" cap="none" normalizeH="0" baseline="0" dirty="0">
+                <a:ln>
+                  <a:noFill/>
+                </a:ln>
+                <a:solidFill>
+                  <a:schemeClr val="tx1"/>
+                </a:solidFill>
+                <a:effectLst/>
+              </a:rPr>
+              <a:t>, </a:t>
+            </a:r>
+            <a:r>
+              <a:rPr kumimoji="0" lang="en-NL" altLang="en-NL" sz="2400" b="0" i="0" u="none" strike="noStrike" cap="none" normalizeH="0" baseline="0" dirty="0" err="1">
+                <a:ln>
+                  <a:noFill/>
+                </a:ln>
+                <a:solidFill>
+                  <a:schemeClr val="tx1"/>
+                </a:solidFill>
+                <a:effectLst/>
+                <a:latin typeface="Arial Unicode MS"/>
+              </a:rPr>
+              <a:t>xlim</a:t>
+            </a:r>
+            <a:r>
+              <a:rPr kumimoji="0" lang="en-NL" altLang="en-NL" sz="2400" b="0" i="0" u="none" strike="noStrike" cap="none" normalizeH="0" baseline="0" dirty="0">
+                <a:ln>
+                  <a:noFill/>
+                </a:ln>
+                <a:solidFill>
+                  <a:schemeClr val="tx1"/>
+                </a:solidFill>
+                <a:effectLst/>
+                <a:latin typeface="Arial Unicode MS"/>
+              </a:rPr>
+              <a:t>()</a:t>
+            </a:r>
+            <a:r>
+              <a:rPr kumimoji="0" lang="en-NL" altLang="en-NL" sz="1800" b="0" i="0" u="none" strike="noStrike" cap="none" normalizeH="0" baseline="0" dirty="0">
+                <a:ln>
+                  <a:noFill/>
+                </a:ln>
+                <a:solidFill>
+                  <a:schemeClr val="tx1"/>
+                </a:solidFill>
+                <a:effectLst/>
+              </a:rPr>
+              <a:t>, </a:t>
+            </a:r>
+            <a:r>
+              <a:rPr kumimoji="0" lang="en-NL" altLang="en-NL" sz="2400" b="0" i="0" u="none" strike="noStrike" cap="none" normalizeH="0" baseline="0" dirty="0">
+                <a:ln>
+                  <a:noFill/>
+                </a:ln>
+                <a:solidFill>
+                  <a:schemeClr val="tx1"/>
+                </a:solidFill>
+                <a:effectLst/>
+                <a:latin typeface="Arial Unicode MS"/>
+              </a:rPr>
+              <a:t>plot()</a:t>
+            </a:r>
+            <a:r>
+              <a:rPr kumimoji="0" lang="en-NL" altLang="en-NL" sz="1800" b="0" i="0" u="none" strike="noStrike" cap="none" normalizeH="0" baseline="0" dirty="0">
+                <a:ln>
+                  <a:noFill/>
+                </a:ln>
+                <a:solidFill>
+                  <a:schemeClr val="tx1"/>
+                </a:solidFill>
+                <a:effectLst/>
+              </a:rPr>
+              <a:t>, and </a:t>
+            </a:r>
+            <a:r>
+              <a:rPr kumimoji="0" lang="en-NL" altLang="en-NL" sz="2400" b="0" i="0" u="none" strike="noStrike" cap="none" normalizeH="0" baseline="0" dirty="0">
+                <a:ln>
+                  <a:noFill/>
+                </a:ln>
+                <a:solidFill>
+                  <a:schemeClr val="tx1"/>
+                </a:solidFill>
+                <a:effectLst/>
+                <a:latin typeface="Arial Unicode MS"/>
+              </a:rPr>
+              <a:t>show()</a:t>
+            </a:r>
+            <a:r>
+              <a:rPr kumimoji="0" lang="en-NL" altLang="en-NL" sz="1800" b="0" i="0" u="none" strike="noStrike" cap="none" normalizeH="0" baseline="0" dirty="0">
+                <a:ln>
+                  <a:noFill/>
+                </a:ln>
+                <a:solidFill>
+                  <a:schemeClr val="tx1"/>
+                </a:solidFill>
+                <a:effectLst/>
+              </a:rPr>
+              <a:t> functions.</a:t>
+            </a:r>
+            <a:r>
+              <a:rPr kumimoji="0" lang="en-NL" altLang="en-NL" sz="4800" b="0" i="0" u="none" strike="noStrike" cap="none" normalizeH="0" baseline="0" dirty="0">
+                <a:ln>
+                  <a:noFill/>
+                </a:ln>
+                <a:solidFill>
+                  <a:schemeClr val="tx1"/>
+                </a:solidFill>
+                <a:effectLst/>
+                <a:latin typeface="Arial" panose="020B0604020202020204" pitchFamily="34" charset="0"/>
+              </a:rPr>
+              <a:t> </a:t>
+            </a:r>
+            <a:endParaRPr kumimoji="0" lang="en-US" altLang="en-NL" sz="2400" b="0" i="0" u="none" strike="noStrike" cap="none" normalizeH="0" baseline="0" dirty="0">
+              <a:ln>
+                <a:noFill/>
+              </a:ln>
+              <a:solidFill>
+                <a:schemeClr val="tx1"/>
+              </a:solidFill>
+              <a:effectLst/>
+              <a:latin typeface="Arial" panose="020B0604020202020204" pitchFamily="34" charset="0"/>
+              <a:ea typeface="+mn-lt"/>
+              <a:cs typeface="+mn-lt"/>
+            </a:endParaRPr>
+          </a:p>
+          <a:p>
+            <a:endParaRPr lang="en-US" sz="2400" dirty="0">
+              <a:latin typeface="Arial" panose="020B0604020202020204" pitchFamily="34" charset="0"/>
+              <a:ea typeface="+mn-lt"/>
+              <a:cs typeface="+mn-lt"/>
+            </a:endParaRPr>
+          </a:p>
+          <a:p>
+            <a:r>
+              <a:rPr lang="en-US" sz="2400" dirty="0">
+                <a:latin typeface="Arial" panose="020B0604020202020204" pitchFamily="34" charset="0"/>
+                <a:ea typeface="+mn-lt"/>
+                <a:cs typeface="+mn-lt"/>
+              </a:rPr>
+              <a:t>We can separate the </a:t>
+            </a:r>
+            <a:r>
+              <a:rPr lang="en-US" sz="2400" dirty="0" err="1">
+                <a:latin typeface="Arial" panose="020B0604020202020204" pitchFamily="34" charset="0"/>
+                <a:ea typeface="+mn-lt"/>
+                <a:cs typeface="+mn-lt"/>
+              </a:rPr>
+              <a:t>rgb</a:t>
+            </a:r>
+            <a:r>
+              <a:rPr lang="en-US" sz="2400" dirty="0">
+                <a:latin typeface="Arial" panose="020B0604020202020204" pitchFamily="34" charset="0"/>
+                <a:ea typeface="+mn-lt"/>
+                <a:cs typeface="+mn-lt"/>
+              </a:rPr>
+              <a:t> </a:t>
+            </a:r>
+            <a:r>
+              <a:rPr lang="en-US" sz="2400" dirty="0" err="1">
+                <a:latin typeface="Arial" panose="020B0604020202020204" pitchFamily="34" charset="0"/>
+                <a:ea typeface="+mn-lt"/>
+                <a:cs typeface="+mn-lt"/>
+              </a:rPr>
+              <a:t>channls</a:t>
+            </a:r>
+            <a:r>
+              <a:rPr lang="en-US" sz="2400" dirty="0">
+                <a:latin typeface="Arial" panose="020B0604020202020204" pitchFamily="34" charset="0"/>
+                <a:ea typeface="+mn-lt"/>
+                <a:cs typeface="+mn-lt"/>
+              </a:rPr>
+              <a:t> by slicing</a:t>
+            </a:r>
+          </a:p>
+          <a:p>
+            <a:endParaRPr lang="en-US" sz="2400" dirty="0">
+              <a:latin typeface="Arial" panose="020B0604020202020204" pitchFamily="34" charset="0"/>
+              <a:ea typeface="+mn-lt"/>
+              <a:cs typeface="+mn-lt"/>
+            </a:endParaRPr>
+          </a:p>
+          <a:p>
+            <a:r>
+              <a:rPr lang="en-US" sz="2400" dirty="0">
+                <a:latin typeface="Arial" panose="020B0604020202020204" pitchFamily="34" charset="0"/>
+                <a:ea typeface="+mn-lt"/>
+                <a:cs typeface="+mn-lt"/>
+              </a:rPr>
+              <a:t>We can harness </a:t>
+            </a:r>
+            <a:r>
+              <a:rPr lang="en-US" sz="2400" dirty="0" err="1">
+                <a:latin typeface="Arial" panose="020B0604020202020204" pitchFamily="34" charset="0"/>
+                <a:ea typeface="+mn-lt"/>
+                <a:cs typeface="+mn-lt"/>
+              </a:rPr>
+              <a:t>numpy</a:t>
+            </a:r>
+            <a:r>
+              <a:rPr lang="en-US" sz="2400" dirty="0">
+                <a:latin typeface="Arial" panose="020B0604020202020204" pitchFamily="34" charset="0"/>
+                <a:ea typeface="+mn-lt"/>
+                <a:cs typeface="+mn-lt"/>
+              </a:rPr>
+              <a:t> i.e. </a:t>
+            </a:r>
+            <a:r>
+              <a:rPr lang="en-US" sz="2400" dirty="0" err="1">
+                <a:latin typeface="Arial" panose="020B0604020202020204" pitchFamily="34" charset="0"/>
+                <a:ea typeface="+mn-lt"/>
+                <a:cs typeface="+mn-lt"/>
+              </a:rPr>
+              <a:t>np.histogram</a:t>
+            </a:r>
+            <a:r>
+              <a:rPr lang="en-US" sz="2400" dirty="0">
+                <a:latin typeface="Arial" panose="020B0604020202020204" pitchFamily="34" charset="0"/>
+                <a:ea typeface="+mn-lt"/>
+                <a:cs typeface="+mn-lt"/>
+              </a:rPr>
+              <a:t> function</a:t>
+            </a:r>
+            <a:endParaRPr lang="en-US" sz="2400" dirty="0">
+              <a:ea typeface="+mn-lt"/>
+              <a:cs typeface="+mn-lt"/>
+            </a:endParaRPr>
+          </a:p>
+          <a:p>
+            <a:endParaRPr lang="en-US" sz="2400" dirty="0">
+              <a:ea typeface="+mn-lt"/>
+              <a:cs typeface="+mn-lt"/>
+            </a:endParaRPr>
+          </a:p>
+          <a:p>
+            <a:r>
+              <a:rPr lang="en-US" sz="2400" dirty="0">
+                <a:ea typeface="+mn-lt"/>
+                <a:cs typeface="+mn-lt"/>
+              </a:rPr>
+              <a:t>Histograms have lots of uses, not </a:t>
+            </a:r>
+            <a:r>
+              <a:rPr lang="en-US" sz="2400">
+                <a:ea typeface="+mn-lt"/>
+                <a:cs typeface="+mn-lt"/>
+              </a:rPr>
+              <a:t>all covere</a:t>
+            </a:r>
+            <a:r>
+              <a:rPr lang="en-US" sz="2400" dirty="0">
+                <a:ea typeface="+mn-lt"/>
+                <a:cs typeface="+mn-lt"/>
+              </a:rPr>
+              <a:t>d</a:t>
+            </a:r>
+            <a:endParaRPr lang="en-US" sz="2400" dirty="0">
+              <a:cs typeface="Arial"/>
+            </a:endParaRPr>
+          </a:p>
+          <a:p>
+            <a:endParaRPr lang="en-US" dirty="0"/>
+          </a:p>
+        </p:txBody>
+      </p:sp>
+    </p:spTree>
+    <p:extLst>
+      <p:ext uri="{BB962C8B-B14F-4D97-AF65-F5344CB8AC3E}">
+        <p14:creationId xmlns:p14="http://schemas.microsoft.com/office/powerpoint/2010/main" val="2528131720"/>
       </p:ext>
     </p:extLst>
   </p:cSld>

</xml_diff>